<commit_message>
update mission, resize figures
</commit_message>
<xml_diff>
--- a/Fig. 1_updated0 -to Nicole.pptx
+++ b/Fig. 1_updated0 -to Nicole.pptx
@@ -201,7 +201,7 @@
           <a:p>
             <a:fld id="{50D27DF9-C019-47AF-AC01-E4894084BABB}" type="datetimeFigureOut">
               <a:rPr lang="en-US" smtClean="0"/>
-              <a:t>1/25/2023</a:t>
+              <a:t>1/27/2023</a:t>
             </a:fld>
             <a:endParaRPr lang="en-US"/>
           </a:p>
@@ -1019,7 +1019,7 @@
           <a:p>
             <a:fld id="{1F3CB690-AD3A-458D-BC2E-E09D8993389B}" type="datetimeFigureOut">
               <a:rPr lang="en-US" smtClean="0"/>
-              <a:t>1/25/2023</a:t>
+              <a:t>1/27/2023</a:t>
             </a:fld>
             <a:endParaRPr lang="en-US"/>
           </a:p>
@@ -1189,7 +1189,7 @@
           <a:p>
             <a:fld id="{1F3CB690-AD3A-458D-BC2E-E09D8993389B}" type="datetimeFigureOut">
               <a:rPr lang="en-US" smtClean="0"/>
-              <a:t>1/25/2023</a:t>
+              <a:t>1/27/2023</a:t>
             </a:fld>
             <a:endParaRPr lang="en-US"/>
           </a:p>
@@ -1369,7 +1369,7 @@
           <a:p>
             <a:fld id="{1F3CB690-AD3A-458D-BC2E-E09D8993389B}" type="datetimeFigureOut">
               <a:rPr lang="en-US" smtClean="0"/>
-              <a:t>1/25/2023</a:t>
+              <a:t>1/27/2023</a:t>
             </a:fld>
             <a:endParaRPr lang="en-US"/>
           </a:p>
@@ -1539,7 +1539,7 @@
           <a:p>
             <a:fld id="{1F3CB690-AD3A-458D-BC2E-E09D8993389B}" type="datetimeFigureOut">
               <a:rPr lang="en-US" smtClean="0"/>
-              <a:t>1/25/2023</a:t>
+              <a:t>1/27/2023</a:t>
             </a:fld>
             <a:endParaRPr lang="en-US"/>
           </a:p>
@@ -1783,7 +1783,7 @@
           <a:p>
             <a:fld id="{1F3CB690-AD3A-458D-BC2E-E09D8993389B}" type="datetimeFigureOut">
               <a:rPr lang="en-US" smtClean="0"/>
-              <a:t>1/25/2023</a:t>
+              <a:t>1/27/2023</a:t>
             </a:fld>
             <a:endParaRPr lang="en-US"/>
           </a:p>
@@ -2015,7 +2015,7 @@
           <a:p>
             <a:fld id="{1F3CB690-AD3A-458D-BC2E-E09D8993389B}" type="datetimeFigureOut">
               <a:rPr lang="en-US" smtClean="0"/>
-              <a:t>1/25/2023</a:t>
+              <a:t>1/27/2023</a:t>
             </a:fld>
             <a:endParaRPr lang="en-US"/>
           </a:p>
@@ -2382,7 +2382,7 @@
           <a:p>
             <a:fld id="{1F3CB690-AD3A-458D-BC2E-E09D8993389B}" type="datetimeFigureOut">
               <a:rPr lang="en-US" smtClean="0"/>
-              <a:t>1/25/2023</a:t>
+              <a:t>1/27/2023</a:t>
             </a:fld>
             <a:endParaRPr lang="en-US"/>
           </a:p>
@@ -2500,7 +2500,7 @@
           <a:p>
             <a:fld id="{1F3CB690-AD3A-458D-BC2E-E09D8993389B}" type="datetimeFigureOut">
               <a:rPr lang="en-US" smtClean="0"/>
-              <a:t>1/25/2023</a:t>
+              <a:t>1/27/2023</a:t>
             </a:fld>
             <a:endParaRPr lang="en-US"/>
           </a:p>
@@ -2595,7 +2595,7 @@
           <a:p>
             <a:fld id="{1F3CB690-AD3A-458D-BC2E-E09D8993389B}" type="datetimeFigureOut">
               <a:rPr lang="en-US" smtClean="0"/>
-              <a:t>1/25/2023</a:t>
+              <a:t>1/27/2023</a:t>
             </a:fld>
             <a:endParaRPr lang="en-US"/>
           </a:p>
@@ -2872,7 +2872,7 @@
           <a:p>
             <a:fld id="{1F3CB690-AD3A-458D-BC2E-E09D8993389B}" type="datetimeFigureOut">
               <a:rPr lang="en-US" smtClean="0"/>
-              <a:t>1/25/2023</a:t>
+              <a:t>1/27/2023</a:t>
             </a:fld>
             <a:endParaRPr lang="en-US"/>
           </a:p>
@@ -3129,7 +3129,7 @@
           <a:p>
             <a:fld id="{1F3CB690-AD3A-458D-BC2E-E09D8993389B}" type="datetimeFigureOut">
               <a:rPr lang="en-US" smtClean="0"/>
-              <a:t>1/25/2023</a:t>
+              <a:t>1/27/2023</a:t>
             </a:fld>
             <a:endParaRPr lang="en-US"/>
           </a:p>
@@ -3342,7 +3342,7 @@
           <a:p>
             <a:fld id="{1F3CB690-AD3A-458D-BC2E-E09D8993389B}" type="datetimeFigureOut">
               <a:rPr lang="en-US" smtClean="0"/>
-              <a:t>1/25/2023</a:t>
+              <a:t>1/27/2023</a:t>
             </a:fld>
             <a:endParaRPr lang="en-US"/>
           </a:p>
@@ -4534,7 +4534,7 @@
         </p:nvGrpSpPr>
         <p:grpSpPr>
           <a:xfrm>
-            <a:off x="1384300" y="1041400"/>
+            <a:off x="1356591" y="1041400"/>
             <a:ext cx="7016750" cy="3721100"/>
             <a:chOff x="1384300" y="1041400"/>
             <a:chExt cx="7016750" cy="3721100"/>
@@ -4608,10 +4608,10 @@
           </p:nvGrpSpPr>
           <p:grpSpPr>
             <a:xfrm>
-              <a:off x="1651001" y="1676403"/>
-              <a:ext cx="6430428" cy="2083067"/>
-              <a:chOff x="2972190" y="4022240"/>
-              <a:chExt cx="2443805" cy="562007"/>
+              <a:off x="2233353" y="1823249"/>
+              <a:ext cx="5248100" cy="1734899"/>
+              <a:chOff x="3193506" y="4061859"/>
+              <a:chExt cx="1994476" cy="468072"/>
             </a:xfrm>
           </p:grpSpPr>
           <p:pic>
@@ -4635,8 +4635,8 @@
             </p:blipFill>
             <p:spPr bwMode="auto">
               <a:xfrm>
-                <a:off x="4380333" y="4022240"/>
-                <a:ext cx="1035662" cy="562007"/>
+                <a:off x="4327799" y="4061859"/>
+                <a:ext cx="860183" cy="468072"/>
               </a:xfrm>
               <a:prstGeom prst="rect">
                 <a:avLst/>
@@ -4655,8 +4655,8 @@
             </p:nvSpPr>
             <p:spPr>
               <a:xfrm>
-                <a:off x="4162366" y="4169022"/>
-                <a:ext cx="154016" cy="234778"/>
+                <a:off x="4140445" y="4197949"/>
+                <a:ext cx="154016" cy="176923"/>
               </a:xfrm>
               <a:prstGeom prst="rightArrow">
                 <a:avLst/>
@@ -4714,8 +4714,8 @@
             </p:blipFill>
             <p:spPr>
               <a:xfrm>
-                <a:off x="2972190" y="4224821"/>
-                <a:ext cx="1126225" cy="178979"/>
+                <a:off x="3193506" y="4238082"/>
+                <a:ext cx="913601" cy="96657"/>
               </a:xfrm>
               <a:prstGeom prst="rect">
                 <a:avLst/>
@@ -4920,10 +4920,10 @@
           </p:nvGrpSpPr>
           <p:grpSpPr>
             <a:xfrm>
-              <a:off x="2436576" y="2040174"/>
-              <a:ext cx="3951768" cy="2971881"/>
-              <a:chOff x="1960371" y="1975238"/>
-              <a:chExt cx="1238883" cy="982681"/>
+              <a:off x="2635636" y="2209803"/>
+              <a:ext cx="3713459" cy="2710132"/>
+              <a:chOff x="2022777" y="2031327"/>
+              <a:chExt cx="1164173" cy="896131"/>
             </a:xfrm>
           </p:grpSpPr>
           <p:pic>
@@ -4954,8 +4954,8 @@
             </p:blipFill>
             <p:spPr>
               <a:xfrm>
-                <a:off x="1960371" y="1981734"/>
-                <a:ext cx="805822" cy="960602"/>
+                <a:off x="2022777" y="2031327"/>
+                <a:ext cx="748368" cy="892112"/>
               </a:xfrm>
               <a:prstGeom prst="rect">
                 <a:avLst/>
@@ -4978,8 +4978,8 @@
             </p:blipFill>
             <p:spPr>
               <a:xfrm>
-                <a:off x="2841446" y="1975238"/>
-                <a:ext cx="354893" cy="354893"/>
+                <a:off x="2855887" y="2034719"/>
+                <a:ext cx="318323" cy="318323"/>
               </a:xfrm>
               <a:prstGeom prst="rect">
                 <a:avLst/>
@@ -5002,8 +5002,8 @@
             </p:blipFill>
             <p:spPr>
               <a:xfrm>
-                <a:off x="2862697" y="2330129"/>
-                <a:ext cx="333641" cy="309299"/>
+                <a:off x="2878016" y="2353042"/>
+                <a:ext cx="285424" cy="264600"/>
               </a:xfrm>
               <a:prstGeom prst="rect">
                 <a:avLst/>
@@ -5025,8 +5025,8 @@
             </p:blipFill>
             <p:spPr>
               <a:xfrm rot="186362">
-                <a:off x="2874221" y="2648488"/>
-                <a:ext cx="325033" cy="309431"/>
+                <a:off x="2881792" y="2636948"/>
+                <a:ext cx="305158" cy="290510"/>
               </a:xfrm>
               <a:prstGeom prst="rect">
                 <a:avLst/>

</xml_diff>